<commit_message>
Scripts for an example figure for delayed and non-delayed eventprop learning.
</commit_message>
<xml_diff>
--- a/figures.pptx
+++ b/figures.pptx
@@ -5,12 +5,13 @@
     <p:sldMasterId id="2147483648" r:id="rId1"/>
   </p:sldMasterIdLst>
   <p:notesMasterIdLst>
-    <p:notesMasterId r:id="rId5"/>
+    <p:notesMasterId r:id="rId6"/>
   </p:notesMasterIdLst>
   <p:sldIdLst>
     <p:sldId id="256" r:id="rId2"/>
     <p:sldId id="257" r:id="rId3"/>
     <p:sldId id="258" r:id="rId4"/>
+    <p:sldId id="259" r:id="rId5"/>
   </p:sldIdLst>
   <p:sldSz cx="12192000" cy="6858000"/>
   <p:notesSz cx="6858000" cy="9144000"/>
@@ -199,7 +200,7 @@
           <a:p>
             <a:fld id="{45125081-A2B4-7D44-834C-5D7BF92718FA}" type="datetimeFigureOut">
               <a:rPr lang="en-US" smtClean="0"/>
-              <a:t>11/29/24</a:t>
+              <a:t>12/3/24</a:t>
             </a:fld>
             <a:endParaRPr lang="en-US"/>
           </a:p>
@@ -808,7 +809,7 @@
           <a:p>
             <a:fld id="{B051D6FB-DDB1-4B43-8206-C6F3EE1DE3BB}" type="datetimeFigureOut">
               <a:rPr lang="en-US" smtClean="0"/>
-              <a:t>11/29/24</a:t>
+              <a:t>12/3/24</a:t>
             </a:fld>
             <a:endParaRPr lang="en-US"/>
           </a:p>
@@ -1008,7 +1009,7 @@
           <a:p>
             <a:fld id="{B051D6FB-DDB1-4B43-8206-C6F3EE1DE3BB}" type="datetimeFigureOut">
               <a:rPr lang="en-US" smtClean="0"/>
-              <a:t>11/29/24</a:t>
+              <a:t>12/3/24</a:t>
             </a:fld>
             <a:endParaRPr lang="en-US"/>
           </a:p>
@@ -1218,7 +1219,7 @@
           <a:p>
             <a:fld id="{B051D6FB-DDB1-4B43-8206-C6F3EE1DE3BB}" type="datetimeFigureOut">
               <a:rPr lang="en-US" smtClean="0"/>
-              <a:t>11/29/24</a:t>
+              <a:t>12/3/24</a:t>
             </a:fld>
             <a:endParaRPr lang="en-US"/>
           </a:p>
@@ -1418,7 +1419,7 @@
           <a:p>
             <a:fld id="{B051D6FB-DDB1-4B43-8206-C6F3EE1DE3BB}" type="datetimeFigureOut">
               <a:rPr lang="en-US" smtClean="0"/>
-              <a:t>11/29/24</a:t>
+              <a:t>12/3/24</a:t>
             </a:fld>
             <a:endParaRPr lang="en-US"/>
           </a:p>
@@ -1694,7 +1695,7 @@
           <a:p>
             <a:fld id="{B051D6FB-DDB1-4B43-8206-C6F3EE1DE3BB}" type="datetimeFigureOut">
               <a:rPr lang="en-US" smtClean="0"/>
-              <a:t>11/29/24</a:t>
+              <a:t>12/3/24</a:t>
             </a:fld>
             <a:endParaRPr lang="en-US"/>
           </a:p>
@@ -1962,7 +1963,7 @@
           <a:p>
             <a:fld id="{B051D6FB-DDB1-4B43-8206-C6F3EE1DE3BB}" type="datetimeFigureOut">
               <a:rPr lang="en-US" smtClean="0"/>
-              <a:t>11/29/24</a:t>
+              <a:t>12/3/24</a:t>
             </a:fld>
             <a:endParaRPr lang="en-US"/>
           </a:p>
@@ -2377,7 +2378,7 @@
           <a:p>
             <a:fld id="{B051D6FB-DDB1-4B43-8206-C6F3EE1DE3BB}" type="datetimeFigureOut">
               <a:rPr lang="en-US" smtClean="0"/>
-              <a:t>11/29/24</a:t>
+              <a:t>12/3/24</a:t>
             </a:fld>
             <a:endParaRPr lang="en-US"/>
           </a:p>
@@ -2519,7 +2520,7 @@
           <a:p>
             <a:fld id="{B051D6FB-DDB1-4B43-8206-C6F3EE1DE3BB}" type="datetimeFigureOut">
               <a:rPr lang="en-US" smtClean="0"/>
-              <a:t>11/29/24</a:t>
+              <a:t>12/3/24</a:t>
             </a:fld>
             <a:endParaRPr lang="en-US"/>
           </a:p>
@@ -2632,7 +2633,7 @@
           <a:p>
             <a:fld id="{B051D6FB-DDB1-4B43-8206-C6F3EE1DE3BB}" type="datetimeFigureOut">
               <a:rPr lang="en-US" smtClean="0"/>
-              <a:t>11/29/24</a:t>
+              <a:t>12/3/24</a:t>
             </a:fld>
             <a:endParaRPr lang="en-US"/>
           </a:p>
@@ -2945,7 +2946,7 @@
           <a:p>
             <a:fld id="{B051D6FB-DDB1-4B43-8206-C6F3EE1DE3BB}" type="datetimeFigureOut">
               <a:rPr lang="en-US" smtClean="0"/>
-              <a:t>11/29/24</a:t>
+              <a:t>12/3/24</a:t>
             </a:fld>
             <a:endParaRPr lang="en-US"/>
           </a:p>
@@ -3234,7 +3235,7 @@
           <a:p>
             <a:fld id="{B051D6FB-DDB1-4B43-8206-C6F3EE1DE3BB}" type="datetimeFigureOut">
               <a:rPr lang="en-US" smtClean="0"/>
-              <a:t>11/29/24</a:t>
+              <a:t>12/3/24</a:t>
             </a:fld>
             <a:endParaRPr lang="en-US"/>
           </a:p>
@@ -3477,7 +3478,7 @@
           <a:p>
             <a:fld id="{B051D6FB-DDB1-4B43-8206-C6F3EE1DE3BB}" type="datetimeFigureOut">
               <a:rPr lang="en-US" smtClean="0"/>
-              <a:t>11/29/24</a:t>
+              <a:t>12/3/24</a:t>
             </a:fld>
             <a:endParaRPr lang="en-US"/>
           </a:p>
@@ -13470,6 +13471,241 @@
 </p:sld>
 </file>
 
+<file path=ppt/slides/slide4.xml><?xml version="1.0" encoding="utf-8"?>
+<p:sld xmlns:a="http://schemas.openxmlformats.org/drawingml/2006/main" xmlns:r="http://schemas.openxmlformats.org/officeDocument/2006/relationships" xmlns:p="http://schemas.openxmlformats.org/presentationml/2006/main">
+  <p:cSld>
+    <p:spTree>
+      <p:nvGrpSpPr>
+        <p:cNvPr id="1" name=""/>
+        <p:cNvGrpSpPr/>
+        <p:nvPr/>
+      </p:nvGrpSpPr>
+      <p:grpSpPr>
+        <a:xfrm>
+          <a:off x="0" y="0"/>
+          <a:ext cx="0" cy="0"/>
+          <a:chOff x="0" y="0"/>
+          <a:chExt cx="0" cy="0"/>
+        </a:xfrm>
+      </p:grpSpPr>
+      <p:pic>
+        <p:nvPicPr>
+          <p:cNvPr id="3" name="Picture 2">
+            <a:extLst>
+              <a:ext uri="{FF2B5EF4-FFF2-40B4-BE49-F238E27FC236}">
+                <a16:creationId xmlns:a16="http://schemas.microsoft.com/office/drawing/2014/main" id="{2AAD590E-4020-5606-7AE5-CD126F97C583}"/>
+              </a:ext>
+            </a:extLst>
+          </p:cNvPr>
+          <p:cNvPicPr>
+            <a:picLocks noChangeAspect="1"/>
+          </p:cNvPicPr>
+          <p:nvPr/>
+        </p:nvPicPr>
+        <p:blipFill>
+          <a:blip r:embed="rId2"/>
+          <a:stretch>
+            <a:fillRect/>
+          </a:stretch>
+        </p:blipFill>
+        <p:spPr>
+          <a:xfrm>
+            <a:off x="1524000" y="685800"/>
+            <a:ext cx="7772400" cy="4663440"/>
+          </a:xfrm>
+          <a:prstGeom prst="rect">
+            <a:avLst/>
+          </a:prstGeom>
+        </p:spPr>
+      </p:pic>
+      <p:sp>
+        <p:nvSpPr>
+          <p:cNvPr id="4" name="TextBox 3">
+            <a:extLst>
+              <a:ext uri="{FF2B5EF4-FFF2-40B4-BE49-F238E27FC236}">
+                <a16:creationId xmlns:a16="http://schemas.microsoft.com/office/drawing/2014/main" id="{E74EA883-DC62-AA52-51D6-0BEDBA27E2F2}"/>
+              </a:ext>
+            </a:extLst>
+          </p:cNvPr>
+          <p:cNvSpPr txBox="1"/>
+          <p:nvPr/>
+        </p:nvSpPr>
+        <p:spPr>
+          <a:xfrm rot="16200000">
+            <a:off x="902355" y="1355834"/>
+            <a:ext cx="873957" cy="369332"/>
+          </a:xfrm>
+          <a:prstGeom prst="rect">
+            <a:avLst/>
+          </a:prstGeom>
+          <a:noFill/>
+        </p:spPr>
+        <p:txBody>
+          <a:bodyPr wrap="none" rtlCol="0">
+            <a:spAutoFit/>
+          </a:bodyPr>
+          <a:lstStyle/>
+          <a:p>
+            <a:r>
+              <a:rPr lang="en-US" dirty="0"/>
+              <a:t>hidden</a:t>
+            </a:r>
+          </a:p>
+        </p:txBody>
+      </p:sp>
+      <p:sp>
+        <p:nvSpPr>
+          <p:cNvPr id="5" name="TextBox 4">
+            <a:extLst>
+              <a:ext uri="{FF2B5EF4-FFF2-40B4-BE49-F238E27FC236}">
+                <a16:creationId xmlns:a16="http://schemas.microsoft.com/office/drawing/2014/main" id="{F6BE036E-15EE-689A-A163-4E8BB6EBF194}"/>
+              </a:ext>
+            </a:extLst>
+          </p:cNvPr>
+          <p:cNvSpPr txBox="1"/>
+          <p:nvPr/>
+        </p:nvSpPr>
+        <p:spPr>
+          <a:xfrm rot="16200000">
+            <a:off x="915179" y="2395875"/>
+            <a:ext cx="848309" cy="369332"/>
+          </a:xfrm>
+          <a:prstGeom prst="rect">
+            <a:avLst/>
+          </a:prstGeom>
+          <a:noFill/>
+        </p:spPr>
+        <p:txBody>
+          <a:bodyPr wrap="none" rtlCol="0">
+            <a:spAutoFit/>
+          </a:bodyPr>
+          <a:lstStyle/>
+          <a:p>
+            <a:r>
+              <a:rPr lang="en-US" dirty="0"/>
+              <a:t>output</a:t>
+            </a:r>
+          </a:p>
+        </p:txBody>
+      </p:sp>
+      <p:sp>
+        <p:nvSpPr>
+          <p:cNvPr id="6" name="TextBox 5">
+            <a:extLst>
+              <a:ext uri="{FF2B5EF4-FFF2-40B4-BE49-F238E27FC236}">
+                <a16:creationId xmlns:a16="http://schemas.microsoft.com/office/drawing/2014/main" id="{4AB49007-C8C9-390A-6088-74348BA1B3AB}"/>
+              </a:ext>
+            </a:extLst>
+          </p:cNvPr>
+          <p:cNvSpPr txBox="1"/>
+          <p:nvPr/>
+        </p:nvSpPr>
+        <p:spPr>
+          <a:xfrm rot="16200000">
+            <a:off x="915179" y="3494206"/>
+            <a:ext cx="848309" cy="369332"/>
+          </a:xfrm>
+          <a:prstGeom prst="rect">
+            <a:avLst/>
+          </a:prstGeom>
+          <a:noFill/>
+        </p:spPr>
+        <p:txBody>
+          <a:bodyPr wrap="none" rtlCol="0">
+            <a:spAutoFit/>
+          </a:bodyPr>
+          <a:lstStyle/>
+          <a:p>
+            <a:r>
+              <a:rPr lang="en-US" dirty="0"/>
+              <a:t>output</a:t>
+            </a:r>
+          </a:p>
+        </p:txBody>
+      </p:sp>
+      <p:sp>
+        <p:nvSpPr>
+          <p:cNvPr id="7" name="TextBox 6">
+            <a:extLst>
+              <a:ext uri="{FF2B5EF4-FFF2-40B4-BE49-F238E27FC236}">
+                <a16:creationId xmlns:a16="http://schemas.microsoft.com/office/drawing/2014/main" id="{BD8F31DF-63DB-C1DC-DFF4-B6BDB43BCA5B}"/>
+              </a:ext>
+            </a:extLst>
+          </p:cNvPr>
+          <p:cNvSpPr txBox="1"/>
+          <p:nvPr/>
+        </p:nvSpPr>
+        <p:spPr>
+          <a:xfrm rot="16200000">
+            <a:off x="902355" y="4605360"/>
+            <a:ext cx="873957" cy="369332"/>
+          </a:xfrm>
+          <a:prstGeom prst="rect">
+            <a:avLst/>
+          </a:prstGeom>
+          <a:noFill/>
+        </p:spPr>
+        <p:txBody>
+          <a:bodyPr wrap="none" rtlCol="0">
+            <a:spAutoFit/>
+          </a:bodyPr>
+          <a:lstStyle/>
+          <a:p>
+            <a:r>
+              <a:rPr lang="en-US" dirty="0"/>
+              <a:t>hidden</a:t>
+            </a:r>
+          </a:p>
+        </p:txBody>
+      </p:sp>
+      <p:sp>
+        <p:nvSpPr>
+          <p:cNvPr id="8" name="TextBox 7">
+            <a:extLst>
+              <a:ext uri="{FF2B5EF4-FFF2-40B4-BE49-F238E27FC236}">
+                <a16:creationId xmlns:a16="http://schemas.microsoft.com/office/drawing/2014/main" id="{3F45A46A-5BBD-4E8F-F6D9-CA20E1E36F9A}"/>
+              </a:ext>
+            </a:extLst>
+          </p:cNvPr>
+          <p:cNvSpPr txBox="1"/>
+          <p:nvPr/>
+        </p:nvSpPr>
+        <p:spPr>
+          <a:xfrm rot="16200000">
+            <a:off x="533023" y="1889097"/>
+            <a:ext cx="873957" cy="369332"/>
+          </a:xfrm>
+          <a:prstGeom prst="rect">
+            <a:avLst/>
+          </a:prstGeom>
+          <a:noFill/>
+        </p:spPr>
+        <p:txBody>
+          <a:bodyPr wrap="none" rtlCol="0">
+            <a:spAutoFit/>
+          </a:bodyPr>
+          <a:lstStyle/>
+          <a:p>
+            <a:r>
+              <a:rPr lang="en-US" dirty="0"/>
+              <a:t>hidden</a:t>
+            </a:r>
+          </a:p>
+        </p:txBody>
+      </p:sp>
+    </p:spTree>
+    <p:extLst>
+      <p:ext uri="{BB962C8B-B14F-4D97-AF65-F5344CB8AC3E}">
+        <p14:creationId xmlns:p14="http://schemas.microsoft.com/office/powerpoint/2010/main" val="3319017073"/>
+      </p:ext>
+    </p:extLst>
+  </p:cSld>
+  <p:clrMapOvr>
+    <a:masterClrMapping/>
+  </p:clrMapOvr>
+</p:sld>
+</file>
+
 <file path=ppt/theme/theme1.xml><?xml version="1.0" encoding="utf-8"?>
 <a:theme xmlns:a="http://schemas.openxmlformats.org/drawingml/2006/main" name="Office Theme">
   <a:themeElements>

</xml_diff>